<commit_message>
updated tables and figures for revision 1 for Ecology
</commit_message>
<xml_diff>
--- a/Tables_Figures/Bias/Figure_Bias.pptx
+++ b/Tables_Figures/Bias/Figure_Bias.pptx
@@ -6,6 +6,7 @@
   </p:sldMasterIdLst>
   <p:sldIdLst>
     <p:sldId id="256" r:id="rId2"/>
+    <p:sldId id="257" r:id="rId3"/>
   </p:sldIdLst>
   <p:sldSz cx="6858000" cy="9144000" type="screen4x3"/>
   <p:notesSz cx="6858000" cy="9144000"/>
@@ -288,7 +289,7 @@
           <a:p>
             <a:fld id="{F249E9C0-EF9A-C941-B439-6943321F071C}" type="datetimeFigureOut">
               <a:rPr lang="en-US" smtClean="0"/>
-              <a:t>8/6/14</a:t>
+              <a:t>12/4/14</a:t>
             </a:fld>
             <a:endParaRPr lang="en-US"/>
           </a:p>
@@ -458,7 +459,7 @@
           <a:p>
             <a:fld id="{F249E9C0-EF9A-C941-B439-6943321F071C}" type="datetimeFigureOut">
               <a:rPr lang="en-US" smtClean="0"/>
-              <a:t>8/6/14</a:t>
+              <a:t>12/4/14</a:t>
             </a:fld>
             <a:endParaRPr lang="en-US"/>
           </a:p>
@@ -638,7 +639,7 @@
           <a:p>
             <a:fld id="{F249E9C0-EF9A-C941-B439-6943321F071C}" type="datetimeFigureOut">
               <a:rPr lang="en-US" smtClean="0"/>
-              <a:t>8/6/14</a:t>
+              <a:t>12/4/14</a:t>
             </a:fld>
             <a:endParaRPr lang="en-US"/>
           </a:p>
@@ -808,7 +809,7 @@
           <a:p>
             <a:fld id="{F249E9C0-EF9A-C941-B439-6943321F071C}" type="datetimeFigureOut">
               <a:rPr lang="en-US" smtClean="0"/>
-              <a:t>8/6/14</a:t>
+              <a:t>12/4/14</a:t>
             </a:fld>
             <a:endParaRPr lang="en-US"/>
           </a:p>
@@ -1054,7 +1055,7 @@
           <a:p>
             <a:fld id="{F249E9C0-EF9A-C941-B439-6943321F071C}" type="datetimeFigureOut">
               <a:rPr lang="en-US" smtClean="0"/>
-              <a:t>8/6/14</a:t>
+              <a:t>12/4/14</a:t>
             </a:fld>
             <a:endParaRPr lang="en-US"/>
           </a:p>
@@ -1342,7 +1343,7 @@
           <a:p>
             <a:fld id="{F249E9C0-EF9A-C941-B439-6943321F071C}" type="datetimeFigureOut">
               <a:rPr lang="en-US" smtClean="0"/>
-              <a:t>8/6/14</a:t>
+              <a:t>12/4/14</a:t>
             </a:fld>
             <a:endParaRPr lang="en-US"/>
           </a:p>
@@ -1764,7 +1765,7 @@
           <a:p>
             <a:fld id="{F249E9C0-EF9A-C941-B439-6943321F071C}" type="datetimeFigureOut">
               <a:rPr lang="en-US" smtClean="0"/>
-              <a:t>8/6/14</a:t>
+              <a:t>12/4/14</a:t>
             </a:fld>
             <a:endParaRPr lang="en-US"/>
           </a:p>
@@ -1882,7 +1883,7 @@
           <a:p>
             <a:fld id="{F249E9C0-EF9A-C941-B439-6943321F071C}" type="datetimeFigureOut">
               <a:rPr lang="en-US" smtClean="0"/>
-              <a:t>8/6/14</a:t>
+              <a:t>12/4/14</a:t>
             </a:fld>
             <a:endParaRPr lang="en-US"/>
           </a:p>
@@ -1977,7 +1978,7 @@
           <a:p>
             <a:fld id="{F249E9C0-EF9A-C941-B439-6943321F071C}" type="datetimeFigureOut">
               <a:rPr lang="en-US" smtClean="0"/>
-              <a:t>8/6/14</a:t>
+              <a:t>12/4/14</a:t>
             </a:fld>
             <a:endParaRPr lang="en-US"/>
           </a:p>
@@ -2254,7 +2255,7 @@
           <a:p>
             <a:fld id="{F249E9C0-EF9A-C941-B439-6943321F071C}" type="datetimeFigureOut">
               <a:rPr lang="en-US" smtClean="0"/>
-              <a:t>8/6/14</a:t>
+              <a:t>12/4/14</a:t>
             </a:fld>
             <a:endParaRPr lang="en-US"/>
           </a:p>
@@ -2507,7 +2508,7 @@
           <a:p>
             <a:fld id="{F249E9C0-EF9A-C941-B439-6943321F071C}" type="datetimeFigureOut">
               <a:rPr lang="en-US" smtClean="0"/>
-              <a:t>8/6/14</a:t>
+              <a:t>12/4/14</a:t>
             </a:fld>
             <a:endParaRPr lang="en-US"/>
           </a:p>
@@ -2720,7 +2721,7 @@
           <a:p>
             <a:fld id="{F249E9C0-EF9A-C941-B439-6943321F071C}" type="datetimeFigureOut">
               <a:rPr lang="en-US" smtClean="0"/>
-              <a:t>8/6/14</a:t>
+              <a:t>12/4/14</a:t>
             </a:fld>
             <a:endParaRPr lang="en-US"/>
           </a:p>
@@ -3307,14 +3308,7 @@
                     <a:latin typeface="Times"/>
                     <a:cs typeface="Times"/>
                   </a:rPr>
-                  <a:t> </a:t>
-                </a:r>
-                <a:r>
-                  <a:rPr lang="en-US" dirty="0" smtClean="0">
-                    <a:latin typeface="Times"/>
-                    <a:cs typeface="Times"/>
-                  </a:rPr>
-                  <a:t>structures</a:t>
+                  <a:t> structures</a:t>
                 </a:r>
               </a:p>
               <a:p>
@@ -3429,14 +3423,7 @@
                     <a:latin typeface="Times"/>
                     <a:cs typeface="Times"/>
                   </a:rPr>
-                  <a:t>(a</a:t>
-                </a:r>
-                <a:r>
-                  <a:rPr lang="en-US" dirty="0" smtClean="0">
-                    <a:latin typeface="Times"/>
-                    <a:cs typeface="Times"/>
-                  </a:rPr>
-                  <a:t>)   </a:t>
+                  <a:t>(a)   </a:t>
                 </a:r>
                 <a:r>
                   <a:rPr lang="en-US" sz="1400" dirty="0" smtClean="0">
@@ -3501,14 +3488,7 @@
                     <a:latin typeface="Times"/>
                     <a:cs typeface="Times"/>
                   </a:rPr>
-                  <a:t>(b</a:t>
-                </a:r>
-                <a:r>
-                  <a:rPr lang="en-US" dirty="0" smtClean="0">
-                    <a:latin typeface="Times"/>
-                    <a:cs typeface="Times"/>
-                  </a:rPr>
-                  <a:t>)   </a:t>
+                  <a:t>(b)   </a:t>
                 </a:r>
                 <a:r>
                   <a:rPr lang="en-US" sz="1400" dirty="0" smtClean="0">
@@ -3604,14 +3584,7 @@
                     <a:latin typeface="Times"/>
                     <a:cs typeface="Times"/>
                   </a:rPr>
-                  <a:t>(c</a:t>
-                </a:r>
-                <a:r>
-                  <a:rPr lang="en-US" dirty="0" smtClean="0">
-                    <a:latin typeface="Times"/>
-                    <a:cs typeface="Times"/>
-                  </a:rPr>
-                  <a:t>)   </a:t>
+                  <a:t>(c)   </a:t>
                 </a:r>
                 <a:r>
                   <a:rPr lang="en-US" sz="1400" dirty="0" smtClean="0">
@@ -3685,6 +3658,400 @@
     <p:extLst>
       <p:ext uri="{BB962C8B-B14F-4D97-AF65-F5344CB8AC3E}">
         <p14:creationId xmlns:p14="http://schemas.microsoft.com/office/powerpoint/2010/main" val="3948845393"/>
+      </p:ext>
+    </p:extLst>
+  </p:cSld>
+  <p:clrMapOvr>
+    <a:masterClrMapping/>
+  </p:clrMapOvr>
+</p:sld>
+</file>
+
+<file path=ppt/slides/slide2.xml><?xml version="1.0" encoding="utf-8"?>
+<p:sld xmlns:a="http://schemas.openxmlformats.org/drawingml/2006/main" xmlns:r="http://schemas.openxmlformats.org/officeDocument/2006/relationships" xmlns:p="http://schemas.openxmlformats.org/presentationml/2006/main">
+  <p:cSld>
+    <p:spTree>
+      <p:nvGrpSpPr>
+        <p:cNvPr id="1" name=""/>
+        <p:cNvGrpSpPr/>
+        <p:nvPr/>
+      </p:nvGrpSpPr>
+      <p:grpSpPr>
+        <a:xfrm>
+          <a:off x="0" y="0"/>
+          <a:ext cx="0" cy="0"/>
+          <a:chOff x="0" y="0"/>
+          <a:chExt cx="0" cy="0"/>
+        </a:xfrm>
+      </p:grpSpPr>
+      <p:grpSp>
+        <p:nvGrpSpPr>
+          <p:cNvPr id="4" name="Group 3"/>
+          <p:cNvGrpSpPr/>
+          <p:nvPr/>
+        </p:nvGrpSpPr>
+        <p:grpSpPr>
+          <a:xfrm>
+            <a:off x="1302584" y="375189"/>
+            <a:ext cx="4269329" cy="7898008"/>
+            <a:chOff x="1302584" y="375189"/>
+            <a:chExt cx="4269329" cy="7898008"/>
+          </a:xfrm>
+        </p:grpSpPr>
+        <p:pic>
+          <p:nvPicPr>
+            <p:cNvPr id="14" name="Picture 13" descr="p.5_J3.pdf"/>
+            <p:cNvPicPr>
+              <a:picLocks noChangeAspect="1"/>
+            </p:cNvPicPr>
+            <p:nvPr/>
+          </p:nvPicPr>
+          <p:blipFill>
+            <a:blip r:embed="rId2">
+              <a:extLst>
+                <a:ext uri="{28A0092B-C50C-407E-A947-70E740481C1C}">
+                  <a14:useLocalDpi xmlns:a14="http://schemas.microsoft.com/office/drawing/2010/main" val="0"/>
+                </a:ext>
+              </a:extLst>
+            </a:blip>
+            <a:stretch>
+              <a:fillRect/>
+            </a:stretch>
+          </p:blipFill>
+          <p:spPr>
+            <a:xfrm>
+              <a:off x="1457113" y="375189"/>
+              <a:ext cx="4114800" cy="2743200"/>
+            </a:xfrm>
+            <a:prstGeom prst="rect">
+              <a:avLst/>
+            </a:prstGeom>
+          </p:spPr>
+        </p:pic>
+        <p:pic>
+          <p:nvPicPr>
+            <p:cNvPr id="15" name="Picture 14" descr="p.5_J3_N24.pdf"/>
+            <p:cNvPicPr>
+              <a:picLocks noChangeAspect="1"/>
+            </p:cNvPicPr>
+            <p:nvPr/>
+          </p:nvPicPr>
+          <p:blipFill>
+            <a:blip r:embed="rId3">
+              <a:extLst>
+                <a:ext uri="{28A0092B-C50C-407E-A947-70E740481C1C}">
+                  <a14:useLocalDpi xmlns:a14="http://schemas.microsoft.com/office/drawing/2010/main" val="0"/>
+                </a:ext>
+              </a:extLst>
+            </a:blip>
+            <a:stretch>
+              <a:fillRect/>
+            </a:stretch>
+          </p:blipFill>
+          <p:spPr>
+            <a:xfrm>
+              <a:off x="1457113" y="2735628"/>
+              <a:ext cx="4114800" cy="2743200"/>
+            </a:xfrm>
+            <a:prstGeom prst="rect">
+              <a:avLst/>
+            </a:prstGeom>
+          </p:spPr>
+        </p:pic>
+        <p:pic>
+          <p:nvPicPr>
+            <p:cNvPr id="16" name="Picture 15" descr="p.5_J3_N36.pdf"/>
+            <p:cNvPicPr>
+              <a:picLocks noChangeAspect="1"/>
+            </p:cNvPicPr>
+            <p:nvPr/>
+          </p:nvPicPr>
+          <p:blipFill>
+            <a:blip r:embed="rId4">
+              <a:extLst>
+                <a:ext uri="{28A0092B-C50C-407E-A947-70E740481C1C}">
+                  <a14:useLocalDpi xmlns:a14="http://schemas.microsoft.com/office/drawing/2010/main" val="0"/>
+                </a:ext>
+              </a:extLst>
+            </a:blip>
+            <a:stretch>
+              <a:fillRect/>
+            </a:stretch>
+          </p:blipFill>
+          <p:spPr>
+            <a:xfrm>
+              <a:off x="1457113" y="5078239"/>
+              <a:ext cx="4114800" cy="2743200"/>
+            </a:xfrm>
+            <a:prstGeom prst="rect">
+              <a:avLst/>
+            </a:prstGeom>
+          </p:spPr>
+        </p:pic>
+        <p:sp>
+          <p:nvSpPr>
+            <p:cNvPr id="17" name="TextBox 16"/>
+            <p:cNvSpPr txBox="1"/>
+            <p:nvPr/>
+          </p:nvSpPr>
+          <p:spPr>
+            <a:xfrm>
+              <a:off x="1968238" y="592266"/>
+              <a:ext cx="1008772" cy="369332"/>
+            </a:xfrm>
+            <a:prstGeom prst="rect">
+              <a:avLst/>
+            </a:prstGeom>
+            <a:noFill/>
+          </p:spPr>
+          <p:txBody>
+            <a:bodyPr wrap="none" rtlCol="0">
+              <a:spAutoFit/>
+            </a:bodyPr>
+            <a:lstStyle/>
+            <a:p>
+              <a:r>
+                <a:rPr lang="en-US" dirty="0" smtClean="0">
+                  <a:latin typeface="Times"/>
+                  <a:cs typeface="Times"/>
+                </a:rPr>
+                <a:t>(a</a:t>
+              </a:r>
+              <a:r>
+                <a:rPr lang="en-US" dirty="0" smtClean="0">
+                  <a:latin typeface="Times"/>
+                  <a:cs typeface="Times"/>
+                </a:rPr>
+                <a:t>) </a:t>
+              </a:r>
+              <a:r>
+                <a:rPr lang="en-US" sz="1400" i="1" dirty="0" smtClean="0">
+                  <a:latin typeface="Times"/>
+                  <a:cs typeface="Times"/>
+                </a:rPr>
+                <a:t>N = 12</a:t>
+              </a:r>
+              <a:endParaRPr lang="en-US" sz="1400" dirty="0">
+                <a:latin typeface="Times"/>
+                <a:cs typeface="Times"/>
+              </a:endParaRPr>
+            </a:p>
+          </p:txBody>
+        </p:sp>
+        <p:sp>
+          <p:nvSpPr>
+            <p:cNvPr id="18" name="TextBox 17"/>
+            <p:cNvSpPr txBox="1"/>
+            <p:nvPr/>
+          </p:nvSpPr>
+          <p:spPr>
+            <a:xfrm>
+              <a:off x="1968238" y="2919541"/>
+              <a:ext cx="1021734" cy="369332"/>
+            </a:xfrm>
+            <a:prstGeom prst="rect">
+              <a:avLst/>
+            </a:prstGeom>
+            <a:noFill/>
+          </p:spPr>
+          <p:txBody>
+            <a:bodyPr wrap="none" rtlCol="0">
+              <a:spAutoFit/>
+            </a:bodyPr>
+            <a:lstStyle/>
+            <a:p>
+              <a:pPr lvl="0"/>
+              <a:r>
+                <a:rPr lang="en-US" dirty="0" smtClean="0">
+                  <a:latin typeface="Times"/>
+                  <a:cs typeface="Times"/>
+                </a:rPr>
+                <a:t>(</a:t>
+              </a:r>
+              <a:r>
+                <a:rPr lang="en-US" dirty="0" smtClean="0">
+                  <a:latin typeface="Times"/>
+                  <a:cs typeface="Times"/>
+                </a:rPr>
+                <a:t>b) </a:t>
+              </a:r>
+              <a:r>
+                <a:rPr lang="en-US" sz="1400" i="1" dirty="0" smtClean="0">
+                  <a:latin typeface="Times"/>
+                  <a:cs typeface="Times"/>
+                </a:rPr>
+                <a:t>N = 24</a:t>
+              </a:r>
+              <a:endParaRPr lang="en-US" sz="1400" dirty="0">
+                <a:latin typeface="Times"/>
+                <a:cs typeface="Times"/>
+              </a:endParaRPr>
+            </a:p>
+          </p:txBody>
+        </p:sp>
+        <p:sp>
+          <p:nvSpPr>
+            <p:cNvPr id="19" name="TextBox 18"/>
+            <p:cNvSpPr txBox="1"/>
+            <p:nvPr/>
+          </p:nvSpPr>
+          <p:spPr>
+            <a:xfrm>
+              <a:off x="1968238" y="5304650"/>
+              <a:ext cx="1008772" cy="369332"/>
+            </a:xfrm>
+            <a:prstGeom prst="rect">
+              <a:avLst/>
+            </a:prstGeom>
+            <a:noFill/>
+          </p:spPr>
+          <p:txBody>
+            <a:bodyPr wrap="none" rtlCol="0">
+              <a:spAutoFit/>
+            </a:bodyPr>
+            <a:lstStyle/>
+            <a:p>
+              <a:pPr lvl="0"/>
+              <a:r>
+                <a:rPr lang="en-US" dirty="0" smtClean="0">
+                  <a:latin typeface="Times"/>
+                  <a:cs typeface="Times"/>
+                </a:rPr>
+                <a:t>(c) </a:t>
+              </a:r>
+              <a:r>
+                <a:rPr lang="en-US" sz="1400" i="1" dirty="0" smtClean="0">
+                  <a:latin typeface="Times"/>
+                  <a:cs typeface="Times"/>
+                </a:rPr>
+                <a:t>N = 36</a:t>
+              </a:r>
+              <a:endParaRPr lang="en-US" sz="1400" dirty="0">
+                <a:latin typeface="Times"/>
+                <a:cs typeface="Times"/>
+              </a:endParaRPr>
+            </a:p>
+          </p:txBody>
+        </p:sp>
+        <p:sp>
+          <p:nvSpPr>
+            <p:cNvPr id="20" name="TextBox 19"/>
+            <p:cNvSpPr txBox="1"/>
+            <p:nvPr/>
+          </p:nvSpPr>
+          <p:spPr>
+            <a:xfrm rot="16200000">
+              <a:off x="907604" y="3821420"/>
+              <a:ext cx="1159292" cy="369332"/>
+            </a:xfrm>
+            <a:prstGeom prst="rect">
+              <a:avLst/>
+            </a:prstGeom>
+            <a:noFill/>
+          </p:spPr>
+          <p:txBody>
+            <a:bodyPr wrap="none" rtlCol="0">
+              <a:spAutoFit/>
+            </a:bodyPr>
+            <a:lstStyle/>
+            <a:p>
+              <a:r>
+                <a:rPr lang="en-US" dirty="0" smtClean="0">
+                  <a:latin typeface="Times"/>
+                  <a:cs typeface="Times"/>
+                </a:rPr>
+                <a:t>Frequency</a:t>
+              </a:r>
+              <a:endParaRPr lang="en-US" dirty="0" smtClean="0">
+                <a:latin typeface="Times"/>
+                <a:cs typeface="Times"/>
+              </a:endParaRPr>
+            </a:p>
+          </p:txBody>
+        </p:sp>
+        <p:sp>
+          <p:nvSpPr>
+            <p:cNvPr id="21" name="TextBox 20"/>
+            <p:cNvSpPr txBox="1"/>
+            <p:nvPr/>
+          </p:nvSpPr>
+          <p:spPr>
+            <a:xfrm>
+              <a:off x="2175689" y="7626866"/>
+              <a:ext cx="2832476" cy="646331"/>
+            </a:xfrm>
+            <a:prstGeom prst="rect">
+              <a:avLst/>
+            </a:prstGeom>
+            <a:noFill/>
+          </p:spPr>
+          <p:txBody>
+            <a:bodyPr wrap="none" rtlCol="0">
+              <a:spAutoFit/>
+            </a:bodyPr>
+            <a:lstStyle/>
+            <a:p>
+              <a:pPr algn="ctr"/>
+              <a:r>
+                <a:rPr lang="en-US" dirty="0" smtClean="0">
+                  <a:latin typeface="Times"/>
+                  <a:cs typeface="Times"/>
+                </a:rPr>
+                <a:t>Proportion of </a:t>
+              </a:r>
+              <a:r>
+                <a:rPr lang="en-US" b="1" i="1" dirty="0" err="1" smtClean="0">
+                  <a:latin typeface="Times"/>
+                  <a:cs typeface="Times"/>
+                </a:rPr>
+                <a:t>Z</a:t>
+              </a:r>
+              <a:r>
+                <a:rPr lang="en-US" b="1" i="1" baseline="-25000" dirty="0" err="1" smtClean="0">
+                  <a:latin typeface="Times"/>
+                  <a:cs typeface="Times"/>
+                </a:rPr>
+                <a:t>post</a:t>
+              </a:r>
+              <a:r>
+                <a:rPr lang="en-US" dirty="0" smtClean="0">
+                  <a:latin typeface="Times"/>
+                  <a:cs typeface="Times"/>
+                </a:rPr>
+                <a:t> structures</a:t>
+              </a:r>
+            </a:p>
+            <a:p>
+              <a:pPr algn="ctr"/>
+              <a:r>
+                <a:rPr lang="en-US" dirty="0" smtClean="0">
+                  <a:latin typeface="Times"/>
+                  <a:cs typeface="Times"/>
+                </a:rPr>
+                <a:t>matching true (</a:t>
+              </a:r>
+              <a:r>
+                <a:rPr lang="en-US" b="1" i="1" dirty="0" smtClean="0">
+                  <a:latin typeface="Times"/>
+                  <a:cs typeface="Times"/>
+                </a:rPr>
+                <a:t>Z</a:t>
+              </a:r>
+              <a:r>
+                <a:rPr lang="en-US" dirty="0" smtClean="0">
+                  <a:latin typeface="Times"/>
+                  <a:cs typeface="Times"/>
+                </a:rPr>
+                <a:t>) structure</a:t>
+              </a:r>
+            </a:p>
+          </p:txBody>
+        </p:sp>
+      </p:grpSp>
+    </p:spTree>
+    <p:extLst>
+      <p:ext uri="{BB962C8B-B14F-4D97-AF65-F5344CB8AC3E}">
+        <p14:creationId xmlns:p14="http://schemas.microsoft.com/office/powerpoint/2010/main" val="4211678428"/>
       </p:ext>
     </p:extLst>
   </p:cSld>

</xml_diff>